<commit_message>
GE: final project includes diagram.ppt in main directory
</commit_message>
<xml_diff>
--- a/Diagram.pptx
+++ b/Diagram.pptx
@@ -104,6 +104,11 @@
       </a:defRPr>
     </a:lvl9pPr>
   </p:defaultTextStyle>
+  <p:extLst>
+    <p:ext uri="{EFAFB233-063F-42B5-8137-9DF3F51BA10A}">
+      <p15:sldGuideLst xmlns:p15="http://schemas.microsoft.com/office/powerpoint/2012/main"/>
+    </p:ext>
+  </p:extLst>
 </p:presentation>
 </file>
 
@@ -3835,18 +3840,18 @@
           <p:cNvCxnSpPr>
             <a:cxnSpLocks/>
             <a:stCxn id="24" idx="2"/>
-            <a:endCxn id="56" idx="2"/>
+            <a:endCxn id="3" idx="2"/>
           </p:cNvCxnSpPr>
           <p:nvPr/>
         </p:nvCxnSpPr>
         <p:spPr>
           <a:xfrm rot="16200000" flipH="1">
-            <a:off x="4487815" y="3393888"/>
-            <a:ext cx="1622104" cy="4756228"/>
+            <a:off x="4573130" y="3308573"/>
+            <a:ext cx="1591616" cy="4896370"/>
           </a:xfrm>
           <a:prstGeom prst="bentConnector3">
             <a:avLst>
-              <a:gd name="adj1" fmla="val 114093"/>
+              <a:gd name="adj1" fmla="val 114363"/>
             </a:avLst>
           </a:prstGeom>
           <a:ln>
@@ -3881,14 +3886,14 @@
           <p:cNvCxnSpPr>
             <a:cxnSpLocks/>
             <a:stCxn id="5" idx="2"/>
-            <a:endCxn id="56" idx="0"/>
+            <a:endCxn id="3" idx="0"/>
           </p:cNvCxnSpPr>
           <p:nvPr/>
         </p:nvCxnSpPr>
         <p:spPr>
           <a:xfrm rot="16200000" flipH="1">
-            <a:off x="5750014" y="560802"/>
-            <a:ext cx="273998" cy="3579936"/>
+            <a:off x="5787816" y="523000"/>
+            <a:ext cx="338536" cy="3720078"/>
           </a:xfrm>
           <a:prstGeom prst="bentConnector3">
             <a:avLst/>
@@ -3956,41 +3961,6 @@
           </a:fontRef>
         </p:style>
       </p:cxnSp>
-      <p:pic>
-        <p:nvPicPr>
-          <p:cNvPr id="56" name="Picture 55" descr="Graphical user interface, application&#10;&#10;Description automatically generated">
-            <a:extLst>
-              <a:ext uri="{FF2B5EF4-FFF2-40B4-BE49-F238E27FC236}">
-                <a16:creationId xmlns:a16="http://schemas.microsoft.com/office/drawing/2014/main" id="{C2E26533-F4A3-4FEA-ABF4-6568007F9C8E}"/>
-              </a:ext>
-            </a:extLst>
-          </p:cNvPr>
-          <p:cNvPicPr>
-            <a:picLocks noChangeAspect="1"/>
-          </p:cNvPicPr>
-          <p:nvPr/>
-        </p:nvPicPr>
-        <p:blipFill>
-          <a:blip r:embed="rId3"/>
-          <a:stretch>
-            <a:fillRect/>
-          </a:stretch>
-        </p:blipFill>
-        <p:spPr>
-          <a:xfrm>
-            <a:off x="4806035" y="2487769"/>
-            <a:ext cx="5741891" cy="4095285"/>
-          </a:xfrm>
-          <a:prstGeom prst="rect">
-            <a:avLst/>
-          </a:prstGeom>
-          <a:ln>
-            <a:solidFill>
-              <a:schemeClr val="accent1"/>
-            </a:solidFill>
-          </a:ln>
-        </p:spPr>
-      </p:pic>
       <p:sp>
         <p:nvSpPr>
           <p:cNvPr id="63" name="Rectangle 62">
@@ -4346,6 +4316,41 @@
           </a:fontRef>
         </p:style>
       </p:cxnSp>
+      <p:pic>
+        <p:nvPicPr>
+          <p:cNvPr id="3" name="Picture 2" descr="Graphical user interface, application&#10;&#10;Description automatically generated">
+            <a:extLst>
+              <a:ext uri="{FF2B5EF4-FFF2-40B4-BE49-F238E27FC236}">
+                <a16:creationId xmlns:a16="http://schemas.microsoft.com/office/drawing/2014/main" id="{487A6312-6866-454C-9376-F5612A78E021}"/>
+              </a:ext>
+            </a:extLst>
+          </p:cNvPr>
+          <p:cNvPicPr>
+            <a:picLocks noChangeAspect="1"/>
+          </p:cNvPicPr>
+          <p:nvPr/>
+        </p:nvPicPr>
+        <p:blipFill>
+          <a:blip r:embed="rId3"/>
+          <a:stretch>
+            <a:fillRect/>
+          </a:stretch>
+        </p:blipFill>
+        <p:spPr>
+          <a:xfrm>
+            <a:off x="5004294" y="2552307"/>
+            <a:ext cx="5625657" cy="4000259"/>
+          </a:xfrm>
+          <a:prstGeom prst="rect">
+            <a:avLst/>
+          </a:prstGeom>
+          <a:ln>
+            <a:solidFill>
+              <a:schemeClr val="accent1"/>
+            </a:solidFill>
+          </a:ln>
+        </p:spPr>
+      </p:pic>
     </p:spTree>
     <p:extLst>
       <p:ext uri="{BB962C8B-B14F-4D97-AF65-F5344CB8AC3E}">

</xml_diff>